<commit_message>
zadanie 4 malicke typo v prezentacii
inak aj predchazdajuci commit malo byt napisane ze finish zadanie 4 len som sa sekol, hopa no
</commit_message>
<xml_diff>
--- a/data/cyprich_AP_2024_zadanie4_harm_baza.pptx
+++ b/data/cyprich_AP_2024_zadanie4_harm_baza.pptx
@@ -127,7 +127,7 @@
 <file path=ppt/revisionInfo.xml><?xml version="1.0" encoding="utf-8"?>
 <p1510:revInfo xmlns:a="http://schemas.openxmlformats.org/drawingml/2006/main" xmlns:r="http://schemas.openxmlformats.org/officeDocument/2006/relationships" xmlns:p1510="http://schemas.microsoft.com/office/powerpoint/2015/10/main">
   <p1510:revLst>
-    <p1510:client id="{42F53ACF-DBEB-4543-97C3-7837ADE32E3A}" v="1478" dt="2024-11-15T12:20:56.538"/>
+    <p1510:client id="{42F53ACF-DBEB-4543-97C3-7837ADE32E3A}" v="1573" dt="2024-11-15T16:07:44.568"/>
   </p1510:revLst>
 </p1510:revInfo>
 </file>
@@ -137,7 +137,7 @@
   <pc:docChgLst>
     <pc:chgData name="STUD - Peter Cyprich" userId="098f3bb1-c630-41a5-a724-4a8437abd012" providerId="ADAL" clId="{42F53ACF-DBEB-4543-97C3-7837ADE32E3A}"/>
     <pc:docChg chg="undo redo custSel addSld delSld modSld sldOrd">
-      <pc:chgData name="STUD - Peter Cyprich" userId="098f3bb1-c630-41a5-a724-4a8437abd012" providerId="ADAL" clId="{42F53ACF-DBEB-4543-97C3-7837ADE32E3A}" dt="2024-11-15T12:49:58.937" v="4858" actId="20577"/>
+      <pc:chgData name="STUD - Peter Cyprich" userId="098f3bb1-c630-41a5-a724-4a8437abd012" providerId="ADAL" clId="{42F53ACF-DBEB-4543-97C3-7837ADE32E3A}" dt="2024-11-15T16:07:44.568" v="4952" actId="20577"/>
       <pc:docMkLst>
         <pc:docMk/>
       </pc:docMkLst>
@@ -298,7 +298,7 @@
         </pc:picChg>
       </pc:sldChg>
       <pc:sldChg chg="addSp delSp modSp add mod">
-        <pc:chgData name="STUD - Peter Cyprich" userId="098f3bb1-c630-41a5-a724-4a8437abd012" providerId="ADAL" clId="{42F53ACF-DBEB-4543-97C3-7837ADE32E3A}" dt="2024-11-15T12:01:14.738" v="3900" actId="20577"/>
+        <pc:chgData name="STUD - Peter Cyprich" userId="098f3bb1-c630-41a5-a724-4a8437abd012" providerId="ADAL" clId="{42F53ACF-DBEB-4543-97C3-7837ADE32E3A}" dt="2024-11-15T16:07:44.568" v="4952" actId="20577"/>
         <pc:sldMkLst>
           <pc:docMk/>
           <pc:sldMk cId="3128454567" sldId="260"/>
@@ -320,7 +320,7 @@
           </ac:spMkLst>
         </pc:spChg>
         <pc:graphicFrameChg chg="add mod modGraphic">
-          <ac:chgData name="STUD - Peter Cyprich" userId="098f3bb1-c630-41a5-a724-4a8437abd012" providerId="ADAL" clId="{42F53ACF-DBEB-4543-97C3-7837ADE32E3A}" dt="2024-11-15T11:51:19.249" v="3672" actId="20577"/>
+          <ac:chgData name="STUD - Peter Cyprich" userId="098f3bb1-c630-41a5-a724-4a8437abd012" providerId="ADAL" clId="{42F53ACF-DBEB-4543-97C3-7837ADE32E3A}" dt="2024-11-15T16:07:44.568" v="4952" actId="20577"/>
           <ac:graphicFrameMkLst>
             <pc:docMk/>
             <pc:sldMk cId="3128454567" sldId="260"/>
@@ -12713,8 +12713,8 @@
           </a:p>
         </p:txBody>
       </p:sp>
-      <mc:AlternateContent xmlns:mc="http://schemas.openxmlformats.org/markup-compatibility/2006">
-        <mc:Choice xmlns:a14="http://schemas.microsoft.com/office/drawing/2010/main" Requires="a14">
+      <mc:AlternateContent xmlns:mc="http://schemas.openxmlformats.org/markup-compatibility/2006" xmlns:a14="http://schemas.microsoft.com/office/drawing/2010/main">
+        <mc:Choice Requires="a14">
           <p:graphicFrame>
             <p:nvGraphicFramePr>
               <p:cNvPr id="13" name="Tabuľka 12">
@@ -12942,24 +12942,7 @@
                                     <a:ea typeface="+mn-ea"/>
                                     <a:cs typeface="+mn-cs"/>
                                   </a:rPr>
-                                  <m:t>=−0.33+0.5</m:t>
-                                </m:r>
-                                <m:r>
-                                  <a:rPr kumimoji="0" lang="en-US" sz="1400" b="0" i="1" u="none" strike="noStrike" kern="1200" cap="none" spc="0" normalizeH="0" baseline="0" noProof="0" smtClean="0">
-                                    <a:ln>
-                                      <a:noFill/>
-                                    </a:ln>
-                                    <a:solidFill>
-                                      <a:srgbClr val="000000"/>
-                                    </a:solidFill>
-                                    <a:effectLst/>
-                                    <a:uLnTx/>
-                                    <a:uFillTx/>
-                                    <a:latin typeface="Cambria Math" panose="02040503050406030204" pitchFamily="18" charset="0"/>
-                                    <a:ea typeface="+mn-ea"/>
-                                    <a:cs typeface="+mn-cs"/>
-                                  </a:rPr>
-                                  <m:t>2</m:t>
+                                  <m:t>=−0.33+0.52</m:t>
                                 </m:r>
                                 <m:r>
                                   <a:rPr kumimoji="0" lang="en-US" sz="1400" b="0" i="1" u="none" strike="noStrike" kern="1200" cap="none" spc="0" normalizeH="0" baseline="0" noProof="0" smtClean="0">
@@ -13699,24 +13682,7 @@
                                     <a:ea typeface="+mn-ea"/>
                                     <a:cs typeface="+mn-cs"/>
                                   </a:rPr>
-                                  <m:t>=</m:t>
-                                </m:r>
-                                <m:r>
-                                  <a:rPr kumimoji="0" lang="en-US" sz="1400" b="0" i="1" u="none" strike="noStrike" kern="1200" cap="none" spc="0" normalizeH="0" baseline="0" noProof="0" smtClean="0">
-                                    <a:ln>
-                                      <a:noFill/>
-                                    </a:ln>
-                                    <a:solidFill>
-                                      <a:srgbClr val="000000"/>
-                                    </a:solidFill>
-                                    <a:effectLst/>
-                                    <a:uLnTx/>
-                                    <a:uFillTx/>
-                                    <a:latin typeface="Cambria Math" panose="02040503050406030204" pitchFamily="18" charset="0"/>
-                                    <a:ea typeface="+mn-ea"/>
-                                    <a:cs typeface="+mn-cs"/>
-                                  </a:rPr>
-                                  <m:t>0.04+0</m:t>
+                                  <m:t>=0.04+0</m:t>
                                 </m:r>
                                 <m:r>
                                   <a:rPr kumimoji="0" lang="en-US" sz="1400" b="0" i="1" u="none" strike="noStrike" kern="1200" cap="none" spc="0" normalizeH="0" baseline="0" noProof="0" smtClean="0">
@@ -13911,58 +13877,7 @@
                                     <a:ea typeface="+mn-ea"/>
                                     <a:cs typeface="+mn-cs"/>
                                   </a:rPr>
-                                  <m:t>=</m:t>
-                                </m:r>
-                                <m:r>
-                                  <a:rPr kumimoji="0" lang="en-US" sz="1400" b="0" i="1" u="none" strike="noStrike" kern="1200" cap="none" spc="0" normalizeH="0" baseline="0" noProof="0" smtClean="0">
-                                    <a:ln>
-                                      <a:noFill/>
-                                    </a:ln>
-                                    <a:solidFill>
-                                      <a:srgbClr val="000000"/>
-                                    </a:solidFill>
-                                    <a:effectLst/>
-                                    <a:uLnTx/>
-                                    <a:uFillTx/>
-                                    <a:latin typeface="Cambria Math" panose="02040503050406030204" pitchFamily="18" charset="0"/>
-                                    <a:ea typeface="+mn-ea"/>
-                                    <a:cs typeface="+mn-cs"/>
-                                  </a:rPr>
-                                  <m:t>−0.15</m:t>
-                                </m:r>
-                                <m:r>
-                                  <a:rPr kumimoji="0" lang="en-US" sz="1400" b="0" i="1" u="none" strike="noStrike" kern="1200" cap="none" spc="0" normalizeH="0" baseline="0" noProof="0" smtClean="0">
-                                    <a:ln>
-                                      <a:noFill/>
-                                    </a:ln>
-                                    <a:solidFill>
-                                      <a:srgbClr val="000000"/>
-                                    </a:solidFill>
-                                    <a:effectLst/>
-                                    <a:uLnTx/>
-                                    <a:uFillTx/>
-                                    <a:latin typeface="Cambria Math" panose="02040503050406030204" pitchFamily="18" charset="0"/>
-                                    <a:ea typeface="+mn-ea"/>
-                                    <a:cs typeface="+mn-cs"/>
-                                  </a:rPr>
-                                  <m:t>−</m:t>
-                                </m:r>
-                                <m:r>
-                                  <a:rPr kumimoji="0" lang="en-US" sz="1400" b="0" i="1" u="none" strike="noStrike" kern="1200" cap="none" spc="0" normalizeH="0" baseline="0" noProof="0" smtClean="0">
-                                    <a:ln>
-                                      <a:noFill/>
-                                    </a:ln>
-                                    <a:solidFill>
-                                      <a:srgbClr val="000000"/>
-                                    </a:solidFill>
-                                    <a:effectLst/>
-                                    <a:uLnTx/>
-                                    <a:uFillTx/>
-                                    <a:latin typeface="Cambria Math" panose="02040503050406030204" pitchFamily="18" charset="0"/>
-                                    <a:ea typeface="+mn-ea"/>
-                                    <a:cs typeface="+mn-cs"/>
-                                  </a:rPr>
-                                  <m:t>0.03</m:t>
+                                  <m:t>=−0.15−0.03</m:t>
                                 </m:r>
                                 <m:r>
                                   <a:rPr kumimoji="0" lang="en-US" sz="1400" b="0" i="1" u="none" strike="noStrike" kern="1200" cap="none" spc="0" normalizeH="0" baseline="0" noProof="0" smtClean="0">
@@ -14605,7 +14520,7 @@
             </a:graphic>
           </p:graphicFrame>
         </mc:Choice>
-        <mc:Fallback>
+        <mc:Fallback xmlns="">
           <p:graphicFrame>
             <p:nvGraphicFramePr>
               <p:cNvPr id="13" name="Tabuľka 12">
@@ -15265,14 +15180,14 @@
               <p:nvPr>
                 <p:extLst>
                   <p:ext uri="{D42A27DB-BD31-4B8C-83A1-F6EECF244321}">
-                    <p14:modId xmlns:p14="http://schemas.microsoft.com/office/powerpoint/2010/main" val="427438633"/>
+                    <p14:modId xmlns:p14="http://schemas.microsoft.com/office/powerpoint/2010/main" val="1627975436"/>
                   </p:ext>
                 </p:extLst>
               </p:nvPr>
             </p:nvGraphicFramePr>
             <p:xfrm>
               <a:off x="612649" y="1680898"/>
-              <a:ext cx="2263902" cy="4440852"/>
+              <a:ext cx="2194243" cy="4440852"/>
             </p:xfrm>
             <a:graphic>
               <a:graphicData uri="http://schemas.openxmlformats.org/drawingml/2006/table">
@@ -15281,7 +15196,7 @@
                     <a:tableStyleId>{0505E3EF-67EA-436B-97B2-0124C06EBD24}</a:tableStyleId>
                   </a:tblPr>
                   <a:tblGrid>
-                    <a:gridCol w="2263902">
+                    <a:gridCol w="2194243">
                       <a:extLst>
                         <a:ext uri="{9D8B030D-6E8A-4147-A177-3AD203B41FA5}">
                           <a16:colId xmlns:a16="http://schemas.microsoft.com/office/drawing/2014/main" val="2548978061"/>
@@ -15332,31 +15247,44 @@
                                 <m:jc m:val="left"/>
                               </m:oMathParaPr>
                               <m:oMath xmlns:m="http://schemas.openxmlformats.org/officeDocument/2006/math">
-                                <m:sSub>
-                                  <m:sSubPr>
+                                <m:d>
+                                  <m:dPr>
+                                    <m:begChr m:val="|"/>
+                                    <m:endChr m:val="|"/>
                                     <m:ctrlPr>
-                                      <a:rPr lang="cs-CZ" sz="1400" i="1" smtClean="0">
+                                      <a:rPr lang="en-US" sz="1400" b="0" i="1" smtClean="0">
                                         <a:latin typeface="Cambria Math" panose="02040503050406030204" pitchFamily="18" charset="0"/>
                                       </a:rPr>
                                     </m:ctrlPr>
-                                  </m:sSubPr>
+                                  </m:dPr>
                                   <m:e>
-                                    <m:r>
-                                      <a:rPr lang="en-US" sz="1400" b="0" i="1" smtClean="0">
-                                        <a:latin typeface="Cambria Math" panose="02040503050406030204" pitchFamily="18" charset="0"/>
-                                      </a:rPr>
-                                      <m:t>𝑐</m:t>
-                                    </m:r>
+                                    <m:sSub>
+                                      <m:sSubPr>
+                                        <m:ctrlPr>
+                                          <a:rPr lang="en-US" sz="1400" b="0" i="1" smtClean="0">
+                                            <a:latin typeface="Cambria Math" panose="02040503050406030204" pitchFamily="18" charset="0"/>
+                                          </a:rPr>
+                                        </m:ctrlPr>
+                                      </m:sSubPr>
+                                      <m:e>
+                                        <m:r>
+                                          <a:rPr lang="en-US" sz="1400" b="0" i="1" smtClean="0">
+                                            <a:latin typeface="Cambria Math" panose="02040503050406030204" pitchFamily="18" charset="0"/>
+                                          </a:rPr>
+                                          <m:t>𝑐</m:t>
+                                        </m:r>
+                                      </m:e>
+                                      <m:sub>
+                                        <m:r>
+                                          <a:rPr lang="en-US" sz="1400" b="0" i="1" smtClean="0">
+                                            <a:latin typeface="Cambria Math" panose="02040503050406030204" pitchFamily="18" charset="0"/>
+                                          </a:rPr>
+                                          <m:t>0</m:t>
+                                        </m:r>
+                                      </m:sub>
+                                    </m:sSub>
                                   </m:e>
-                                  <m:sub>
-                                    <m:r>
-                                      <a:rPr lang="en-US" sz="1400" b="0" i="1" smtClean="0">
-                                        <a:latin typeface="Cambria Math" panose="02040503050406030204" pitchFamily="18" charset="0"/>
-                                      </a:rPr>
-                                      <m:t>0</m:t>
-                                    </m:r>
-                                  </m:sub>
-                                </m:sSub>
+                                </m:d>
                                 <m:r>
                                   <a:rPr lang="en-US" sz="1400" b="0" i="1" smtClean="0">
                                     <a:latin typeface="Cambria Math" panose="02040503050406030204" pitchFamily="18" charset="0"/>
@@ -15406,64 +15334,44 @@
                                 <m:jc m:val="left"/>
                               </m:oMathParaPr>
                               <m:oMath xmlns:m="http://schemas.openxmlformats.org/officeDocument/2006/math">
-                                <m:sSub>
-                                  <m:sSubPr>
+                                <m:d>
+                                  <m:dPr>
+                                    <m:begChr m:val="|"/>
+                                    <m:endChr m:val="|"/>
                                     <m:ctrlPr>
-                                      <a:rPr kumimoji="0" lang="cs-CZ" sz="1400" b="0" i="1" u="none" strike="noStrike" kern="1200" cap="none" spc="0" normalizeH="0" baseline="0" noProof="0" smtClean="0">
-                                        <a:ln>
-                                          <a:noFill/>
-                                        </a:ln>
-                                        <a:solidFill>
-                                          <a:srgbClr val="000000"/>
-                                        </a:solidFill>
-                                        <a:effectLst/>
-                                        <a:uLnTx/>
-                                        <a:uFillTx/>
+                                      <a:rPr lang="en-US" sz="1400" b="0" i="1" smtClean="0">
                                         <a:latin typeface="Cambria Math" panose="02040503050406030204" pitchFamily="18" charset="0"/>
-                                        <a:ea typeface="+mn-ea"/>
-                                        <a:cs typeface="+mn-cs"/>
                                       </a:rPr>
                                     </m:ctrlPr>
-                                  </m:sSubPr>
+                                  </m:dPr>
                                   <m:e>
-                                    <m:r>
-                                      <a:rPr kumimoji="0" lang="en-US" sz="1400" b="0" i="1" u="none" strike="noStrike" kern="1200" cap="none" spc="0" normalizeH="0" baseline="0" noProof="0" smtClean="0">
-                                        <a:ln>
-                                          <a:noFill/>
-                                        </a:ln>
-                                        <a:solidFill>
-                                          <a:srgbClr val="000000"/>
-                                        </a:solidFill>
-                                        <a:effectLst/>
-                                        <a:uLnTx/>
-                                        <a:uFillTx/>
-                                        <a:latin typeface="Cambria Math" panose="02040503050406030204" pitchFamily="18" charset="0"/>
-                                        <a:ea typeface="+mn-ea"/>
-                                        <a:cs typeface="+mn-cs"/>
-                                      </a:rPr>
-                                      <m:t>𝑐</m:t>
-                                    </m:r>
+                                    <m:sSub>
+                                      <m:sSubPr>
+                                        <m:ctrlPr>
+                                          <a:rPr lang="en-US" sz="1400" b="0" i="1" smtClean="0">
+                                            <a:latin typeface="Cambria Math" panose="02040503050406030204" pitchFamily="18" charset="0"/>
+                                          </a:rPr>
+                                        </m:ctrlPr>
+                                      </m:sSubPr>
+                                      <m:e>
+                                        <m:r>
+                                          <a:rPr lang="en-US" sz="1400" b="0" i="1" smtClean="0">
+                                            <a:latin typeface="Cambria Math" panose="02040503050406030204" pitchFamily="18" charset="0"/>
+                                          </a:rPr>
+                                          <m:t>𝑐</m:t>
+                                        </m:r>
+                                      </m:e>
+                                      <m:sub>
+                                        <m:r>
+                                          <a:rPr lang="en-US" sz="1400" b="0" i="1" smtClean="0">
+                                            <a:latin typeface="Cambria Math" panose="02040503050406030204" pitchFamily="18" charset="0"/>
+                                          </a:rPr>
+                                          <m:t>1</m:t>
+                                        </m:r>
+                                      </m:sub>
+                                    </m:sSub>
                                   </m:e>
-                                  <m:sub>
-                                    <m:r>
-                                      <a:rPr kumimoji="0" lang="en-US" sz="1400" b="0" i="1" u="none" strike="noStrike" kern="1200" cap="none" spc="0" normalizeH="0" baseline="0" noProof="0" smtClean="0">
-                                        <a:ln>
-                                          <a:noFill/>
-                                        </a:ln>
-                                        <a:solidFill>
-                                          <a:srgbClr val="000000"/>
-                                        </a:solidFill>
-                                        <a:effectLst/>
-                                        <a:uLnTx/>
-                                        <a:uFillTx/>
-                                        <a:latin typeface="Cambria Math" panose="02040503050406030204" pitchFamily="18" charset="0"/>
-                                        <a:ea typeface="+mn-ea"/>
-                                        <a:cs typeface="+mn-cs"/>
-                                      </a:rPr>
-                                      <m:t>1</m:t>
-                                    </m:r>
-                                  </m:sub>
-                                </m:sSub>
+                                </m:d>
                                 <m:r>
                                   <a:rPr kumimoji="0" lang="en-US" sz="1400" b="0" i="1" u="none" strike="noStrike" kern="1200" cap="none" spc="0" normalizeH="0" baseline="0" noProof="0" smtClean="0">
                                     <a:ln>
@@ -15554,64 +15462,44 @@
                                 <m:jc m:val="left"/>
                               </m:oMathParaPr>
                               <m:oMath xmlns:m="http://schemas.openxmlformats.org/officeDocument/2006/math">
-                                <m:sSub>
-                                  <m:sSubPr>
+                                <m:d>
+                                  <m:dPr>
+                                    <m:begChr m:val="|"/>
+                                    <m:endChr m:val="|"/>
                                     <m:ctrlPr>
-                                      <a:rPr kumimoji="0" lang="cs-CZ" sz="1400" b="0" i="1" u="none" strike="noStrike" kern="1200" cap="none" spc="0" normalizeH="0" baseline="0" noProof="0" smtClean="0">
-                                        <a:ln>
-                                          <a:noFill/>
-                                        </a:ln>
-                                        <a:solidFill>
-                                          <a:srgbClr val="000000"/>
-                                        </a:solidFill>
-                                        <a:effectLst/>
-                                        <a:uLnTx/>
-                                        <a:uFillTx/>
+                                      <a:rPr lang="en-US" sz="1400" b="0" i="1" smtClean="0">
                                         <a:latin typeface="Cambria Math" panose="02040503050406030204" pitchFamily="18" charset="0"/>
-                                        <a:ea typeface="+mn-ea"/>
-                                        <a:cs typeface="+mn-cs"/>
                                       </a:rPr>
                                     </m:ctrlPr>
-                                  </m:sSubPr>
+                                  </m:dPr>
                                   <m:e>
-                                    <m:r>
-                                      <a:rPr kumimoji="0" lang="en-US" sz="1400" b="0" i="1" u="none" strike="noStrike" kern="1200" cap="none" spc="0" normalizeH="0" baseline="0" noProof="0" smtClean="0">
-                                        <a:ln>
-                                          <a:noFill/>
-                                        </a:ln>
-                                        <a:solidFill>
-                                          <a:srgbClr val="000000"/>
-                                        </a:solidFill>
-                                        <a:effectLst/>
-                                        <a:uLnTx/>
-                                        <a:uFillTx/>
-                                        <a:latin typeface="Cambria Math" panose="02040503050406030204" pitchFamily="18" charset="0"/>
-                                        <a:ea typeface="+mn-ea"/>
-                                        <a:cs typeface="+mn-cs"/>
-                                      </a:rPr>
-                                      <m:t>𝑐</m:t>
-                                    </m:r>
+                                    <m:sSub>
+                                      <m:sSubPr>
+                                        <m:ctrlPr>
+                                          <a:rPr lang="en-US" sz="1400" b="0" i="1" smtClean="0">
+                                            <a:latin typeface="Cambria Math" panose="02040503050406030204" pitchFamily="18" charset="0"/>
+                                          </a:rPr>
+                                        </m:ctrlPr>
+                                      </m:sSubPr>
+                                      <m:e>
+                                        <m:r>
+                                          <a:rPr lang="en-US" sz="1400" b="0" i="1" smtClean="0">
+                                            <a:latin typeface="Cambria Math" panose="02040503050406030204" pitchFamily="18" charset="0"/>
+                                          </a:rPr>
+                                          <m:t>𝑐</m:t>
+                                        </m:r>
+                                      </m:e>
+                                      <m:sub>
+                                        <m:r>
+                                          <a:rPr lang="en-US" sz="1400" b="0" i="1" smtClean="0">
+                                            <a:latin typeface="Cambria Math" panose="02040503050406030204" pitchFamily="18" charset="0"/>
+                                          </a:rPr>
+                                          <m:t>2</m:t>
+                                        </m:r>
+                                      </m:sub>
+                                    </m:sSub>
                                   </m:e>
-                                  <m:sub>
-                                    <m:r>
-                                      <a:rPr kumimoji="0" lang="en-US" sz="1400" b="0" i="1" u="none" strike="noStrike" kern="1200" cap="none" spc="0" normalizeH="0" baseline="0" noProof="0" smtClean="0">
-                                        <a:ln>
-                                          <a:noFill/>
-                                        </a:ln>
-                                        <a:solidFill>
-                                          <a:srgbClr val="000000"/>
-                                        </a:solidFill>
-                                        <a:effectLst/>
-                                        <a:uLnTx/>
-                                        <a:uFillTx/>
-                                        <a:latin typeface="Cambria Math" panose="02040503050406030204" pitchFamily="18" charset="0"/>
-                                        <a:ea typeface="+mn-ea"/>
-                                        <a:cs typeface="+mn-cs"/>
-                                      </a:rPr>
-                                      <m:t>2</m:t>
-                                    </m:r>
-                                  </m:sub>
-                                </m:sSub>
+                                </m:d>
                                 <m:r>
                                   <a:rPr kumimoji="0" lang="en-US" sz="1400" b="0" i="1" u="none" strike="noStrike" kern="1200" cap="none" spc="0" normalizeH="0" baseline="0" noProof="0" smtClean="0">
                                     <a:ln>
@@ -15685,64 +15573,44 @@
                                 <m:jc m:val="left"/>
                               </m:oMathParaPr>
                               <m:oMath xmlns:m="http://schemas.openxmlformats.org/officeDocument/2006/math">
-                                <m:sSub>
-                                  <m:sSubPr>
+                                <m:d>
+                                  <m:dPr>
+                                    <m:begChr m:val="|"/>
+                                    <m:endChr m:val="|"/>
                                     <m:ctrlPr>
-                                      <a:rPr kumimoji="0" lang="cs-CZ" sz="1400" b="0" i="1" u="none" strike="noStrike" kern="1200" cap="none" spc="0" normalizeH="0" baseline="0" noProof="0" smtClean="0">
-                                        <a:ln>
-                                          <a:noFill/>
-                                        </a:ln>
-                                        <a:solidFill>
-                                          <a:srgbClr val="000000"/>
-                                        </a:solidFill>
-                                        <a:effectLst/>
-                                        <a:uLnTx/>
-                                        <a:uFillTx/>
+                                      <a:rPr lang="en-US" sz="1400" b="0" i="1" smtClean="0">
                                         <a:latin typeface="Cambria Math" panose="02040503050406030204" pitchFamily="18" charset="0"/>
-                                        <a:ea typeface="+mn-ea"/>
-                                        <a:cs typeface="+mn-cs"/>
                                       </a:rPr>
                                     </m:ctrlPr>
-                                  </m:sSubPr>
+                                  </m:dPr>
                                   <m:e>
-                                    <m:r>
-                                      <a:rPr kumimoji="0" lang="en-US" sz="1400" b="0" i="1" u="none" strike="noStrike" kern="1200" cap="none" spc="0" normalizeH="0" baseline="0" noProof="0" smtClean="0">
-                                        <a:ln>
-                                          <a:noFill/>
-                                        </a:ln>
-                                        <a:solidFill>
-                                          <a:srgbClr val="000000"/>
-                                        </a:solidFill>
-                                        <a:effectLst/>
-                                        <a:uLnTx/>
-                                        <a:uFillTx/>
-                                        <a:latin typeface="Cambria Math" panose="02040503050406030204" pitchFamily="18" charset="0"/>
-                                        <a:ea typeface="+mn-ea"/>
-                                        <a:cs typeface="+mn-cs"/>
-                                      </a:rPr>
-                                      <m:t>𝑐</m:t>
-                                    </m:r>
+                                    <m:sSub>
+                                      <m:sSubPr>
+                                        <m:ctrlPr>
+                                          <a:rPr lang="en-US" sz="1400" b="0" i="1" smtClean="0">
+                                            <a:latin typeface="Cambria Math" panose="02040503050406030204" pitchFamily="18" charset="0"/>
+                                          </a:rPr>
+                                        </m:ctrlPr>
+                                      </m:sSubPr>
+                                      <m:e>
+                                        <m:r>
+                                          <a:rPr lang="en-US" sz="1400" b="0" i="1" smtClean="0">
+                                            <a:latin typeface="Cambria Math" panose="02040503050406030204" pitchFamily="18" charset="0"/>
+                                          </a:rPr>
+                                          <m:t>𝑐</m:t>
+                                        </m:r>
+                                      </m:e>
+                                      <m:sub>
+                                        <m:r>
+                                          <a:rPr lang="en-US" sz="1400" b="0" i="1" smtClean="0">
+                                            <a:latin typeface="Cambria Math" panose="02040503050406030204" pitchFamily="18" charset="0"/>
+                                          </a:rPr>
+                                          <m:t>3</m:t>
+                                        </m:r>
+                                      </m:sub>
+                                    </m:sSub>
                                   </m:e>
-                                  <m:sub>
-                                    <m:r>
-                                      <a:rPr kumimoji="0" lang="en-US" sz="1400" b="0" i="1" u="none" strike="noStrike" kern="1200" cap="none" spc="0" normalizeH="0" baseline="0" noProof="0" smtClean="0">
-                                        <a:ln>
-                                          <a:noFill/>
-                                        </a:ln>
-                                        <a:solidFill>
-                                          <a:srgbClr val="000000"/>
-                                        </a:solidFill>
-                                        <a:effectLst/>
-                                        <a:uLnTx/>
-                                        <a:uFillTx/>
-                                        <a:latin typeface="Cambria Math" panose="02040503050406030204" pitchFamily="18" charset="0"/>
-                                        <a:ea typeface="+mn-ea"/>
-                                        <a:cs typeface="+mn-cs"/>
-                                      </a:rPr>
-                                      <m:t>3</m:t>
-                                    </m:r>
-                                  </m:sub>
-                                </m:sSub>
+                                </m:d>
                                 <m:r>
                                   <a:rPr kumimoji="0" lang="en-US" sz="1400" b="0" i="1" u="none" strike="noStrike" kern="1200" cap="none" spc="0" normalizeH="0" baseline="0" noProof="0" smtClean="0">
                                     <a:ln>
@@ -15758,24 +15626,7 @@
                                     <a:ea typeface="+mn-ea"/>
                                     <a:cs typeface="+mn-cs"/>
                                   </a:rPr>
-                                  <m:t>=</m:t>
-                                </m:r>
-                                <m:r>
-                                  <a:rPr kumimoji="0" lang="en-US" sz="1400" b="0" i="1" u="none" strike="noStrike" kern="1200" cap="none" spc="0" normalizeH="0" baseline="0" noProof="0" smtClean="0">
-                                    <a:ln>
-                                      <a:noFill/>
-                                    </a:ln>
-                                    <a:solidFill>
-                                      <a:srgbClr val="000000"/>
-                                    </a:solidFill>
-                                    <a:effectLst/>
-                                    <a:uLnTx/>
-                                    <a:uFillTx/>
-                                    <a:latin typeface="Cambria Math" panose="02040503050406030204" pitchFamily="18" charset="0"/>
-                                    <a:ea typeface="+mn-ea"/>
-                                    <a:cs typeface="+mn-cs"/>
-                                  </a:rPr>
-                                  <m:t>0.07</m:t>
+                                  <m:t>=0.07</m:t>
                                 </m:r>
                               </m:oMath>
                             </m:oMathPara>
@@ -15833,64 +15684,44 @@
                                 <m:jc m:val="left"/>
                               </m:oMathParaPr>
                               <m:oMath xmlns:m="http://schemas.openxmlformats.org/officeDocument/2006/math">
-                                <m:sSub>
-                                  <m:sSubPr>
+                                <m:d>
+                                  <m:dPr>
+                                    <m:begChr m:val="|"/>
+                                    <m:endChr m:val="|"/>
                                     <m:ctrlPr>
-                                      <a:rPr kumimoji="0" lang="cs-CZ" sz="1400" b="0" i="1" u="none" strike="noStrike" kern="1200" cap="none" spc="0" normalizeH="0" baseline="0" noProof="0" smtClean="0">
-                                        <a:ln>
-                                          <a:noFill/>
-                                        </a:ln>
-                                        <a:solidFill>
-                                          <a:srgbClr val="000000"/>
-                                        </a:solidFill>
-                                        <a:effectLst/>
-                                        <a:uLnTx/>
-                                        <a:uFillTx/>
+                                      <a:rPr lang="en-US" sz="1400" b="0" i="1" smtClean="0">
                                         <a:latin typeface="Cambria Math" panose="02040503050406030204" pitchFamily="18" charset="0"/>
-                                        <a:ea typeface="+mn-ea"/>
-                                        <a:cs typeface="+mn-cs"/>
                                       </a:rPr>
                                     </m:ctrlPr>
-                                  </m:sSubPr>
+                                  </m:dPr>
                                   <m:e>
-                                    <m:r>
-                                      <a:rPr kumimoji="0" lang="en-US" sz="1400" b="0" i="1" u="none" strike="noStrike" kern="1200" cap="none" spc="0" normalizeH="0" baseline="0" noProof="0" smtClean="0">
-                                        <a:ln>
-                                          <a:noFill/>
-                                        </a:ln>
-                                        <a:solidFill>
-                                          <a:srgbClr val="000000"/>
-                                        </a:solidFill>
-                                        <a:effectLst/>
-                                        <a:uLnTx/>
-                                        <a:uFillTx/>
-                                        <a:latin typeface="Cambria Math" panose="02040503050406030204" pitchFamily="18" charset="0"/>
-                                        <a:ea typeface="+mn-ea"/>
-                                        <a:cs typeface="+mn-cs"/>
-                                      </a:rPr>
-                                      <m:t>𝑐</m:t>
-                                    </m:r>
+                                    <m:sSub>
+                                      <m:sSubPr>
+                                        <m:ctrlPr>
+                                          <a:rPr lang="en-US" sz="1400" b="0" i="1" smtClean="0">
+                                            <a:latin typeface="Cambria Math" panose="02040503050406030204" pitchFamily="18" charset="0"/>
+                                          </a:rPr>
+                                        </m:ctrlPr>
+                                      </m:sSubPr>
+                                      <m:e>
+                                        <m:r>
+                                          <a:rPr lang="en-US" sz="1400" b="0" i="1" smtClean="0">
+                                            <a:latin typeface="Cambria Math" panose="02040503050406030204" pitchFamily="18" charset="0"/>
+                                          </a:rPr>
+                                          <m:t>𝑐</m:t>
+                                        </m:r>
+                                      </m:e>
+                                      <m:sub>
+                                        <m:r>
+                                          <a:rPr lang="en-US" sz="1400" b="0" i="1" smtClean="0">
+                                            <a:latin typeface="Cambria Math" panose="02040503050406030204" pitchFamily="18" charset="0"/>
+                                          </a:rPr>
+                                          <m:t>4</m:t>
+                                        </m:r>
+                                      </m:sub>
+                                    </m:sSub>
                                   </m:e>
-                                  <m:sub>
-                                    <m:r>
-                                      <a:rPr kumimoji="0" lang="en-US" sz="1400" b="0" i="1" u="none" strike="noStrike" kern="1200" cap="none" spc="0" normalizeH="0" baseline="0" noProof="0" smtClean="0">
-                                        <a:ln>
-                                          <a:noFill/>
-                                        </a:ln>
-                                        <a:solidFill>
-                                          <a:srgbClr val="000000"/>
-                                        </a:solidFill>
-                                        <a:effectLst/>
-                                        <a:uLnTx/>
-                                        <a:uFillTx/>
-                                        <a:latin typeface="Cambria Math" panose="02040503050406030204" pitchFamily="18" charset="0"/>
-                                        <a:ea typeface="+mn-ea"/>
-                                        <a:cs typeface="+mn-cs"/>
-                                      </a:rPr>
-                                      <m:t>4</m:t>
-                                    </m:r>
-                                  </m:sub>
-                                </m:sSub>
+                                </m:d>
                                 <m:r>
                                   <a:rPr kumimoji="0" lang="en-US" sz="1400" b="0" i="1" u="none" strike="noStrike" kern="1200" cap="none" spc="0" normalizeH="0" baseline="0" noProof="0" smtClean="0">
                                     <a:ln>
@@ -15906,24 +15737,7 @@
                                     <a:ea typeface="+mn-ea"/>
                                     <a:cs typeface="+mn-cs"/>
                                   </a:rPr>
-                                  <m:t>=</m:t>
-                                </m:r>
-                                <m:r>
-                                  <a:rPr kumimoji="0" lang="en-US" sz="1400" b="0" i="1" u="none" strike="noStrike" kern="1200" cap="none" spc="0" normalizeH="0" baseline="0" noProof="0" smtClean="0">
-                                    <a:ln>
-                                      <a:noFill/>
-                                    </a:ln>
-                                    <a:solidFill>
-                                      <a:srgbClr val="000000"/>
-                                    </a:solidFill>
-                                    <a:effectLst/>
-                                    <a:uLnTx/>
-                                    <a:uFillTx/>
-                                    <a:latin typeface="Cambria Math" panose="02040503050406030204" pitchFamily="18" charset="0"/>
-                                    <a:ea typeface="+mn-ea"/>
-                                    <a:cs typeface="+mn-cs"/>
-                                  </a:rPr>
-                                  <m:t>0.05</m:t>
+                                  <m:t>=0.05</m:t>
                                 </m:r>
                               </m:oMath>
                             </m:oMathPara>
@@ -15977,64 +15791,44 @@
                           </a:pPr>
                           <a14:m>
                             <m:oMath xmlns:m="http://schemas.openxmlformats.org/officeDocument/2006/math">
-                              <m:sSub>
-                                <m:sSubPr>
+                              <m:d>
+                                <m:dPr>
+                                  <m:begChr m:val="|"/>
+                                  <m:endChr m:val="|"/>
                                   <m:ctrlPr>
-                                    <a:rPr kumimoji="0" lang="cs-CZ" sz="1400" b="0" i="1" u="none" strike="noStrike" kern="1200" cap="none" spc="0" normalizeH="0" baseline="0" noProof="0" smtClean="0">
-                                      <a:ln>
-                                        <a:noFill/>
-                                      </a:ln>
-                                      <a:solidFill>
-                                        <a:srgbClr val="000000"/>
-                                      </a:solidFill>
-                                      <a:effectLst/>
-                                      <a:uLnTx/>
-                                      <a:uFillTx/>
+                                    <a:rPr lang="en-US" sz="1400" b="0" i="1" smtClean="0">
                                       <a:latin typeface="Cambria Math" panose="02040503050406030204" pitchFamily="18" charset="0"/>
-                                      <a:ea typeface="+mn-ea"/>
-                                      <a:cs typeface="+mn-cs"/>
                                     </a:rPr>
                                   </m:ctrlPr>
-                                </m:sSubPr>
+                                </m:dPr>
                                 <m:e>
-                                  <m:r>
-                                    <a:rPr kumimoji="0" lang="en-US" sz="1400" b="0" i="1" u="none" strike="noStrike" kern="1200" cap="none" spc="0" normalizeH="0" baseline="0" noProof="0" smtClean="0">
-                                      <a:ln>
-                                        <a:noFill/>
-                                      </a:ln>
-                                      <a:solidFill>
-                                        <a:srgbClr val="000000"/>
-                                      </a:solidFill>
-                                      <a:effectLst/>
-                                      <a:uLnTx/>
-                                      <a:uFillTx/>
-                                      <a:latin typeface="Cambria Math" panose="02040503050406030204" pitchFamily="18" charset="0"/>
-                                      <a:ea typeface="+mn-ea"/>
-                                      <a:cs typeface="+mn-cs"/>
-                                    </a:rPr>
-                                    <m:t>𝑐</m:t>
-                                  </m:r>
+                                  <m:sSub>
+                                    <m:sSubPr>
+                                      <m:ctrlPr>
+                                        <a:rPr lang="en-US" sz="1400" b="0" i="1" smtClean="0">
+                                          <a:latin typeface="Cambria Math" panose="02040503050406030204" pitchFamily="18" charset="0"/>
+                                        </a:rPr>
+                                      </m:ctrlPr>
+                                    </m:sSubPr>
+                                    <m:e>
+                                      <m:r>
+                                        <a:rPr lang="en-US" sz="1400" b="0" i="1" smtClean="0">
+                                          <a:latin typeface="Cambria Math" panose="02040503050406030204" pitchFamily="18" charset="0"/>
+                                        </a:rPr>
+                                        <m:t>𝑐</m:t>
+                                      </m:r>
+                                    </m:e>
+                                    <m:sub>
+                                      <m:r>
+                                        <a:rPr lang="en-US" sz="1400" b="0" i="1" smtClean="0">
+                                          <a:latin typeface="Cambria Math" panose="02040503050406030204" pitchFamily="18" charset="0"/>
+                                        </a:rPr>
+                                        <m:t>5</m:t>
+                                      </m:r>
+                                    </m:sub>
+                                  </m:sSub>
                                 </m:e>
-                                <m:sub>
-                                  <m:r>
-                                    <a:rPr kumimoji="0" lang="en-US" sz="1400" b="0" i="1" u="none" strike="noStrike" kern="1200" cap="none" spc="0" normalizeH="0" baseline="0" noProof="0" smtClean="0">
-                                      <a:ln>
-                                        <a:noFill/>
-                                      </a:ln>
-                                      <a:solidFill>
-                                        <a:srgbClr val="000000"/>
-                                      </a:solidFill>
-                                      <a:effectLst/>
-                                      <a:uLnTx/>
-                                      <a:uFillTx/>
-                                      <a:latin typeface="Cambria Math" panose="02040503050406030204" pitchFamily="18" charset="0"/>
-                                      <a:ea typeface="+mn-ea"/>
-                                      <a:cs typeface="+mn-cs"/>
-                                    </a:rPr>
-                                    <m:t>5</m:t>
-                                  </m:r>
-                                </m:sub>
-                              </m:sSub>
+                              </m:d>
                               <m:r>
                                 <a:rPr kumimoji="0" lang="en-US" sz="1400" b="0" i="1" u="none" strike="noStrike" kern="1200" cap="none" spc="0" normalizeH="0" baseline="0" noProof="0" smtClean="0">
                                   <a:ln>
@@ -16050,24 +15844,7 @@
                                   <a:ea typeface="+mn-ea"/>
                                   <a:cs typeface="+mn-cs"/>
                                 </a:rPr>
-                                <m:t>=</m:t>
-                              </m:r>
-                              <m:r>
-                                <a:rPr kumimoji="0" lang="en-US" sz="1400" b="0" i="1" u="none" strike="noStrike" kern="1200" cap="none" spc="0" normalizeH="0" baseline="0" noProof="0" smtClean="0">
-                                  <a:ln>
-                                    <a:noFill/>
-                                  </a:ln>
-                                  <a:solidFill>
-                                    <a:srgbClr val="000000"/>
-                                  </a:solidFill>
-                                  <a:effectLst/>
-                                  <a:uLnTx/>
-                                  <a:uFillTx/>
-                                  <a:latin typeface="Cambria Math" panose="02040503050406030204" pitchFamily="18" charset="0"/>
-                                  <a:ea typeface="+mn-ea"/>
-                                  <a:cs typeface="+mn-cs"/>
-                                </a:rPr>
-                                <m:t>0.15</m:t>
+                                <m:t>=0.15</m:t>
                               </m:r>
                             </m:oMath>
                           </a14:m>
@@ -16125,31 +15902,44 @@
                                 <m:jc m:val="left"/>
                               </m:oMathParaPr>
                               <m:oMath xmlns:m="http://schemas.openxmlformats.org/officeDocument/2006/math">
-                                <m:sSub>
-                                  <m:sSubPr>
+                                <m:d>
+                                  <m:dPr>
+                                    <m:begChr m:val="|"/>
+                                    <m:endChr m:val="|"/>
                                     <m:ctrlPr>
-                                      <a:rPr lang="cs-CZ" sz="1400" i="1" smtClean="0">
+                                      <a:rPr lang="en-US" sz="1400" b="0" i="1" smtClean="0">
                                         <a:latin typeface="Cambria Math" panose="02040503050406030204" pitchFamily="18" charset="0"/>
                                       </a:rPr>
                                     </m:ctrlPr>
-                                  </m:sSubPr>
+                                  </m:dPr>
                                   <m:e>
-                                    <m:r>
-                                      <a:rPr lang="en-US" sz="1400" b="0" i="1" smtClean="0">
-                                        <a:latin typeface="Cambria Math" panose="02040503050406030204" pitchFamily="18" charset="0"/>
-                                      </a:rPr>
-                                      <m:t>𝑐</m:t>
-                                    </m:r>
+                                    <m:sSub>
+                                      <m:sSubPr>
+                                        <m:ctrlPr>
+                                          <a:rPr lang="en-US" sz="1400" b="0" i="1" smtClean="0">
+                                            <a:latin typeface="Cambria Math" panose="02040503050406030204" pitchFamily="18" charset="0"/>
+                                          </a:rPr>
+                                        </m:ctrlPr>
+                                      </m:sSubPr>
+                                      <m:e>
+                                        <m:r>
+                                          <a:rPr lang="en-US" sz="1400" b="0" i="1" smtClean="0">
+                                            <a:latin typeface="Cambria Math" panose="02040503050406030204" pitchFamily="18" charset="0"/>
+                                          </a:rPr>
+                                          <m:t>𝑐</m:t>
+                                        </m:r>
+                                      </m:e>
+                                      <m:sub>
+                                        <m:r>
+                                          <a:rPr lang="en-US" sz="1400" b="0" i="1" smtClean="0">
+                                            <a:latin typeface="Cambria Math" panose="02040503050406030204" pitchFamily="18" charset="0"/>
+                                          </a:rPr>
+                                          <m:t>6</m:t>
+                                        </m:r>
+                                      </m:sub>
+                                    </m:sSub>
                                   </m:e>
-                                  <m:sub>
-                                    <m:r>
-                                      <a:rPr lang="en-US" sz="1400" b="0" i="1" smtClean="0">
-                                        <a:latin typeface="Cambria Math" panose="02040503050406030204" pitchFamily="18" charset="0"/>
-                                      </a:rPr>
-                                      <m:t>6</m:t>
-                                    </m:r>
-                                  </m:sub>
-                                </m:sSub>
+                                </m:d>
                                 <m:r>
                                   <a:rPr lang="en-US" sz="1400" b="0" i="1" smtClean="0">
                                     <a:latin typeface="Cambria Math" panose="02040503050406030204" pitchFamily="18" charset="0"/>
@@ -16160,13 +15950,7 @@
                                   <a:rPr lang="en-US" sz="1400" b="0" i="1" strike="sngStrike" smtClean="0">
                                     <a:latin typeface="Cambria Math" panose="02040503050406030204" pitchFamily="18" charset="0"/>
                                   </a:rPr>
-                                  <m:t>0</m:t>
-                                </m:r>
-                                <m:r>
-                                  <a:rPr lang="en-US" sz="1400" b="0" i="1" strike="sngStrike" smtClean="0">
-                                    <a:latin typeface="Cambria Math" panose="02040503050406030204" pitchFamily="18" charset="0"/>
-                                  </a:rPr>
-                                  <m:t>.04</m:t>
+                                  <m:t>0.04</m:t>
                                 </m:r>
                                 <m:r>
                                   <a:rPr lang="en-US" sz="1400" b="0" i="1" smtClean="0">
@@ -16217,64 +16001,44 @@
                                 <m:jc m:val="left"/>
                               </m:oMathParaPr>
                               <m:oMath xmlns:m="http://schemas.openxmlformats.org/officeDocument/2006/math">
-                                <m:sSub>
-                                  <m:sSubPr>
+                                <m:d>
+                                  <m:dPr>
+                                    <m:begChr m:val="|"/>
+                                    <m:endChr m:val="|"/>
                                     <m:ctrlPr>
-                                      <a:rPr kumimoji="0" lang="cs-CZ" sz="1400" b="0" i="1" u="none" strike="noStrike" kern="1200" cap="none" spc="0" normalizeH="0" baseline="0" noProof="0" smtClean="0">
-                                        <a:ln>
-                                          <a:noFill/>
-                                        </a:ln>
-                                        <a:solidFill>
-                                          <a:srgbClr val="000000"/>
-                                        </a:solidFill>
-                                        <a:effectLst/>
-                                        <a:uLnTx/>
-                                        <a:uFillTx/>
+                                      <a:rPr lang="en-US" sz="1400" b="0" i="1" smtClean="0">
                                         <a:latin typeface="Cambria Math" panose="02040503050406030204" pitchFamily="18" charset="0"/>
-                                        <a:ea typeface="+mn-ea"/>
-                                        <a:cs typeface="+mn-cs"/>
                                       </a:rPr>
                                     </m:ctrlPr>
-                                  </m:sSubPr>
+                                  </m:dPr>
                                   <m:e>
-                                    <m:r>
-                                      <a:rPr kumimoji="0" lang="en-US" sz="1400" b="0" i="1" u="none" strike="noStrike" kern="1200" cap="none" spc="0" normalizeH="0" baseline="0" noProof="0" smtClean="0">
-                                        <a:ln>
-                                          <a:noFill/>
-                                        </a:ln>
-                                        <a:solidFill>
-                                          <a:srgbClr val="000000"/>
-                                        </a:solidFill>
-                                        <a:effectLst/>
-                                        <a:uLnTx/>
-                                        <a:uFillTx/>
-                                        <a:latin typeface="Cambria Math" panose="02040503050406030204" pitchFamily="18" charset="0"/>
-                                        <a:ea typeface="+mn-ea"/>
-                                        <a:cs typeface="+mn-cs"/>
-                                      </a:rPr>
-                                      <m:t>𝑐</m:t>
-                                    </m:r>
+                                    <m:sSub>
+                                      <m:sSubPr>
+                                        <m:ctrlPr>
+                                          <a:rPr lang="en-US" sz="1400" b="0" i="1" smtClean="0">
+                                            <a:latin typeface="Cambria Math" panose="02040503050406030204" pitchFamily="18" charset="0"/>
+                                          </a:rPr>
+                                        </m:ctrlPr>
+                                      </m:sSubPr>
+                                      <m:e>
+                                        <m:r>
+                                          <a:rPr lang="en-US" sz="1400" b="0" i="1" smtClean="0">
+                                            <a:latin typeface="Cambria Math" panose="02040503050406030204" pitchFamily="18" charset="0"/>
+                                          </a:rPr>
+                                          <m:t>𝑐</m:t>
+                                        </m:r>
+                                      </m:e>
+                                      <m:sub>
+                                        <m:r>
+                                          <a:rPr lang="en-US" sz="1400" b="0" i="1" smtClean="0">
+                                            <a:latin typeface="Cambria Math" panose="02040503050406030204" pitchFamily="18" charset="0"/>
+                                          </a:rPr>
+                                          <m:t>7</m:t>
+                                        </m:r>
+                                      </m:sub>
+                                    </m:sSub>
                                   </m:e>
-                                  <m:sub>
-                                    <m:r>
-                                      <a:rPr kumimoji="0" lang="en-US" sz="1400" b="0" i="1" u="none" strike="noStrike" kern="1200" cap="none" spc="0" normalizeH="0" baseline="0" noProof="0" smtClean="0">
-                                        <a:ln>
-                                          <a:noFill/>
-                                        </a:ln>
-                                        <a:solidFill>
-                                          <a:srgbClr val="000000"/>
-                                        </a:solidFill>
-                                        <a:effectLst/>
-                                        <a:uLnTx/>
-                                        <a:uFillTx/>
-                                        <a:latin typeface="Cambria Math" panose="02040503050406030204" pitchFamily="18" charset="0"/>
-                                        <a:ea typeface="+mn-ea"/>
-                                        <a:cs typeface="+mn-cs"/>
-                                      </a:rPr>
-                                      <m:t>7</m:t>
-                                    </m:r>
-                                  </m:sub>
-                                </m:sSub>
+                                </m:d>
                                 <m:r>
                                   <a:rPr kumimoji="0" lang="en-US" sz="1400" b="0" i="1" u="none" strike="noStrike" kern="1200" cap="none" spc="0" normalizeH="0" baseline="0" noProof="0" smtClean="0">
                                     <a:ln>
@@ -16365,64 +16129,44 @@
                                 <m:jc m:val="left"/>
                               </m:oMathParaPr>
                               <m:oMath xmlns:m="http://schemas.openxmlformats.org/officeDocument/2006/math">
-                                <m:sSub>
-                                  <m:sSubPr>
+                                <m:d>
+                                  <m:dPr>
+                                    <m:begChr m:val="|"/>
+                                    <m:endChr m:val="|"/>
                                     <m:ctrlPr>
-                                      <a:rPr kumimoji="0" lang="cs-CZ" sz="1400" b="0" i="1" u="none" strike="noStrike" kern="1200" cap="none" spc="0" normalizeH="0" baseline="0" noProof="0" smtClean="0">
-                                        <a:ln>
-                                          <a:noFill/>
-                                        </a:ln>
-                                        <a:solidFill>
-                                          <a:srgbClr val="000000"/>
-                                        </a:solidFill>
-                                        <a:effectLst/>
-                                        <a:uLnTx/>
-                                        <a:uFillTx/>
+                                      <a:rPr lang="en-US" sz="1400" b="0" i="1" smtClean="0">
                                         <a:latin typeface="Cambria Math" panose="02040503050406030204" pitchFamily="18" charset="0"/>
-                                        <a:ea typeface="+mn-ea"/>
-                                        <a:cs typeface="+mn-cs"/>
                                       </a:rPr>
                                     </m:ctrlPr>
-                                  </m:sSubPr>
+                                  </m:dPr>
                                   <m:e>
-                                    <m:r>
-                                      <a:rPr kumimoji="0" lang="en-US" sz="1400" b="0" i="1" u="none" strike="noStrike" kern="1200" cap="none" spc="0" normalizeH="0" baseline="0" noProof="0" smtClean="0">
-                                        <a:ln>
-                                          <a:noFill/>
-                                        </a:ln>
-                                        <a:solidFill>
-                                          <a:srgbClr val="000000"/>
-                                        </a:solidFill>
-                                        <a:effectLst/>
-                                        <a:uLnTx/>
-                                        <a:uFillTx/>
-                                        <a:latin typeface="Cambria Math" panose="02040503050406030204" pitchFamily="18" charset="0"/>
-                                        <a:ea typeface="+mn-ea"/>
-                                        <a:cs typeface="+mn-cs"/>
-                                      </a:rPr>
-                                      <m:t>𝑐</m:t>
-                                    </m:r>
+                                    <m:sSub>
+                                      <m:sSubPr>
+                                        <m:ctrlPr>
+                                          <a:rPr lang="en-US" sz="1400" b="0" i="1" smtClean="0">
+                                            <a:latin typeface="Cambria Math" panose="02040503050406030204" pitchFamily="18" charset="0"/>
+                                          </a:rPr>
+                                        </m:ctrlPr>
+                                      </m:sSubPr>
+                                      <m:e>
+                                        <m:r>
+                                          <a:rPr lang="en-US" sz="1400" b="0" i="1" smtClean="0">
+                                            <a:latin typeface="Cambria Math" panose="02040503050406030204" pitchFamily="18" charset="0"/>
+                                          </a:rPr>
+                                          <m:t>𝑐</m:t>
+                                        </m:r>
+                                      </m:e>
+                                      <m:sub>
+                                        <m:r>
+                                          <a:rPr lang="en-US" sz="1400" b="0" i="1" smtClean="0">
+                                            <a:latin typeface="Cambria Math" panose="02040503050406030204" pitchFamily="18" charset="0"/>
+                                          </a:rPr>
+                                          <m:t>8</m:t>
+                                        </m:r>
+                                      </m:sub>
+                                    </m:sSub>
                                   </m:e>
-                                  <m:sub>
-                                    <m:r>
-                                      <a:rPr kumimoji="0" lang="en-US" sz="1400" b="0" i="1" u="none" strike="noStrike" kern="1200" cap="none" spc="0" normalizeH="0" baseline="0" noProof="0" smtClean="0">
-                                        <a:ln>
-                                          <a:noFill/>
-                                        </a:ln>
-                                        <a:solidFill>
-                                          <a:srgbClr val="000000"/>
-                                        </a:solidFill>
-                                        <a:effectLst/>
-                                        <a:uLnTx/>
-                                        <a:uFillTx/>
-                                        <a:latin typeface="Cambria Math" panose="02040503050406030204" pitchFamily="18" charset="0"/>
-                                        <a:ea typeface="+mn-ea"/>
-                                        <a:cs typeface="+mn-cs"/>
-                                      </a:rPr>
-                                      <m:t>8</m:t>
-                                    </m:r>
-                                  </m:sub>
-                                </m:sSub>
+                                </m:d>
                                 <m:r>
                                   <a:rPr kumimoji="0" lang="en-US" sz="1400" b="0" i="1" u="none" strike="noStrike" kern="1200" cap="none" spc="0" normalizeH="0" baseline="0" noProof="0" smtClean="0">
                                     <a:ln>
@@ -16438,24 +16182,7 @@
                                     <a:ea typeface="+mn-ea"/>
                                     <a:cs typeface="+mn-cs"/>
                                   </a:rPr>
-                                  <m:t>=0.</m:t>
-                                </m:r>
-                                <m:r>
-                                  <a:rPr kumimoji="0" lang="en-US" sz="1400" b="0" i="1" u="none" strike="noStrike" kern="1200" cap="none" spc="0" normalizeH="0" baseline="0" noProof="0" smtClean="0">
-                                    <a:ln>
-                                      <a:noFill/>
-                                    </a:ln>
-                                    <a:solidFill>
-                                      <a:srgbClr val="000000"/>
-                                    </a:solidFill>
-                                    <a:effectLst/>
-                                    <a:uLnTx/>
-                                    <a:uFillTx/>
-                                    <a:latin typeface="Cambria Math" panose="02040503050406030204" pitchFamily="18" charset="0"/>
-                                    <a:ea typeface="+mn-ea"/>
-                                    <a:cs typeface="+mn-cs"/>
-                                  </a:rPr>
-                                  <m:t>05</m:t>
+                                  <m:t>=0.05</m:t>
                                 </m:r>
                               </m:oMath>
                             </m:oMathPara>
@@ -16513,64 +16240,44 @@
                                 <m:jc m:val="left"/>
                               </m:oMathParaPr>
                               <m:oMath xmlns:m="http://schemas.openxmlformats.org/officeDocument/2006/math">
-                                <m:sSub>
-                                  <m:sSubPr>
+                                <m:d>
+                                  <m:dPr>
+                                    <m:begChr m:val="|"/>
+                                    <m:endChr m:val="|"/>
                                     <m:ctrlPr>
-                                      <a:rPr kumimoji="0" lang="cs-CZ" sz="1400" b="0" i="1" u="none" strike="noStrike" kern="1200" cap="none" spc="0" normalizeH="0" baseline="0" noProof="0" smtClean="0">
-                                        <a:ln>
-                                          <a:noFill/>
-                                        </a:ln>
-                                        <a:solidFill>
-                                          <a:srgbClr val="000000"/>
-                                        </a:solidFill>
-                                        <a:effectLst/>
-                                        <a:uLnTx/>
-                                        <a:uFillTx/>
+                                      <a:rPr lang="en-US" sz="1400" b="0" i="1" smtClean="0">
                                         <a:latin typeface="Cambria Math" panose="02040503050406030204" pitchFamily="18" charset="0"/>
-                                        <a:ea typeface="+mn-ea"/>
-                                        <a:cs typeface="+mn-cs"/>
                                       </a:rPr>
                                     </m:ctrlPr>
-                                  </m:sSubPr>
+                                  </m:dPr>
                                   <m:e>
-                                    <m:r>
-                                      <a:rPr kumimoji="0" lang="en-US" sz="1400" b="0" i="1" u="none" strike="noStrike" kern="1200" cap="none" spc="0" normalizeH="0" baseline="0" noProof="0" smtClean="0">
-                                        <a:ln>
-                                          <a:noFill/>
-                                        </a:ln>
-                                        <a:solidFill>
-                                          <a:srgbClr val="000000"/>
-                                        </a:solidFill>
-                                        <a:effectLst/>
-                                        <a:uLnTx/>
-                                        <a:uFillTx/>
-                                        <a:latin typeface="Cambria Math" panose="02040503050406030204" pitchFamily="18" charset="0"/>
-                                        <a:ea typeface="+mn-ea"/>
-                                        <a:cs typeface="+mn-cs"/>
-                                      </a:rPr>
-                                      <m:t>𝑐</m:t>
-                                    </m:r>
+                                    <m:sSub>
+                                      <m:sSubPr>
+                                        <m:ctrlPr>
+                                          <a:rPr lang="en-US" sz="1400" b="0" i="1" smtClean="0">
+                                            <a:latin typeface="Cambria Math" panose="02040503050406030204" pitchFamily="18" charset="0"/>
+                                          </a:rPr>
+                                        </m:ctrlPr>
+                                      </m:sSubPr>
+                                      <m:e>
+                                        <m:r>
+                                          <a:rPr lang="en-US" sz="1400" b="0" i="1" smtClean="0">
+                                            <a:latin typeface="Cambria Math" panose="02040503050406030204" pitchFamily="18" charset="0"/>
+                                          </a:rPr>
+                                          <m:t>𝑐</m:t>
+                                        </m:r>
+                                      </m:e>
+                                      <m:sub>
+                                        <m:r>
+                                          <a:rPr lang="en-US" sz="1400" b="0" i="1" smtClean="0">
+                                            <a:latin typeface="Cambria Math" panose="02040503050406030204" pitchFamily="18" charset="0"/>
+                                          </a:rPr>
+                                          <m:t>9</m:t>
+                                        </m:r>
+                                      </m:sub>
+                                    </m:sSub>
                                   </m:e>
-                                  <m:sub>
-                                    <m:r>
-                                      <a:rPr kumimoji="0" lang="en-US" sz="1400" b="0" i="1" u="none" strike="noStrike" kern="1200" cap="none" spc="0" normalizeH="0" baseline="0" noProof="0" smtClean="0">
-                                        <a:ln>
-                                          <a:noFill/>
-                                        </a:ln>
-                                        <a:solidFill>
-                                          <a:srgbClr val="000000"/>
-                                        </a:solidFill>
-                                        <a:effectLst/>
-                                        <a:uLnTx/>
-                                        <a:uFillTx/>
-                                        <a:latin typeface="Cambria Math" panose="02040503050406030204" pitchFamily="18" charset="0"/>
-                                        <a:ea typeface="+mn-ea"/>
-                                        <a:cs typeface="+mn-cs"/>
-                                      </a:rPr>
-                                      <m:t>9</m:t>
-                                    </m:r>
-                                  </m:sub>
-                                </m:sSub>
+                                </m:d>
                                 <m:r>
                                   <a:rPr kumimoji="0" lang="en-US" sz="1400" b="0" i="1" u="none" strike="noStrike" kern="1200" cap="none" spc="0" normalizeH="0" baseline="0" noProof="0" smtClean="0">
                                     <a:ln>
@@ -16644,64 +16351,50 @@
                                 <m:jc m:val="left"/>
                               </m:oMathParaPr>
                               <m:oMath xmlns:m="http://schemas.openxmlformats.org/officeDocument/2006/math">
-                                <m:sSub>
-                                  <m:sSubPr>
+                                <m:d>
+                                  <m:dPr>
+                                    <m:begChr m:val="|"/>
+                                    <m:endChr m:val="|"/>
                                     <m:ctrlPr>
-                                      <a:rPr kumimoji="0" lang="cs-CZ" sz="1400" b="0" i="1" u="none" strike="noStrike" kern="1200" cap="none" spc="0" normalizeH="0" baseline="0" noProof="0" smtClean="0">
-                                        <a:ln>
-                                          <a:noFill/>
-                                        </a:ln>
-                                        <a:solidFill>
-                                          <a:srgbClr val="000000"/>
-                                        </a:solidFill>
-                                        <a:effectLst/>
-                                        <a:uLnTx/>
-                                        <a:uFillTx/>
+                                      <a:rPr lang="en-US" sz="1400" b="0" i="1" smtClean="0">
                                         <a:latin typeface="Cambria Math" panose="02040503050406030204" pitchFamily="18" charset="0"/>
-                                        <a:ea typeface="+mn-ea"/>
-                                        <a:cs typeface="+mn-cs"/>
                                       </a:rPr>
                                     </m:ctrlPr>
-                                  </m:sSubPr>
+                                  </m:dPr>
                                   <m:e>
-                                    <m:r>
-                                      <a:rPr kumimoji="0" lang="en-US" sz="1400" b="0" i="1" u="none" strike="noStrike" kern="1200" cap="none" spc="0" normalizeH="0" baseline="0" noProof="0" smtClean="0">
-                                        <a:ln>
-                                          <a:noFill/>
-                                        </a:ln>
-                                        <a:solidFill>
-                                          <a:srgbClr val="000000"/>
-                                        </a:solidFill>
-                                        <a:effectLst/>
-                                        <a:uLnTx/>
-                                        <a:uFillTx/>
-                                        <a:latin typeface="Cambria Math" panose="02040503050406030204" pitchFamily="18" charset="0"/>
-                                        <a:ea typeface="+mn-ea"/>
-                                        <a:cs typeface="+mn-cs"/>
-                                      </a:rPr>
-                                      <m:t>𝑐</m:t>
-                                    </m:r>
+                                    <m:sSub>
+                                      <m:sSubPr>
+                                        <m:ctrlPr>
+                                          <a:rPr lang="en-US" sz="1400" b="0" i="1" smtClean="0">
+                                            <a:latin typeface="Cambria Math" panose="02040503050406030204" pitchFamily="18" charset="0"/>
+                                          </a:rPr>
+                                        </m:ctrlPr>
+                                      </m:sSubPr>
+                                      <m:e>
+                                        <m:r>
+                                          <a:rPr lang="en-US" sz="1400" b="0" i="1" smtClean="0">
+                                            <a:latin typeface="Cambria Math" panose="02040503050406030204" pitchFamily="18" charset="0"/>
+                                          </a:rPr>
+                                          <m:t>𝑐</m:t>
+                                        </m:r>
+                                      </m:e>
+                                      <m:sub>
+                                        <m:r>
+                                          <a:rPr lang="en-US" sz="1400" b="0" i="1" smtClean="0">
+                                            <a:latin typeface="Cambria Math" panose="02040503050406030204" pitchFamily="18" charset="0"/>
+                                          </a:rPr>
+                                          <m:t>1</m:t>
+                                        </m:r>
+                                        <m:r>
+                                          <a:rPr lang="en-US" sz="1400" b="0" i="1" smtClean="0">
+                                            <a:latin typeface="Cambria Math" panose="02040503050406030204" pitchFamily="18" charset="0"/>
+                                          </a:rPr>
+                                          <m:t>0</m:t>
+                                        </m:r>
+                                      </m:sub>
+                                    </m:sSub>
                                   </m:e>
-                                  <m:sub>
-                                    <m:r>
-                                      <a:rPr kumimoji="0" lang="en-US" sz="1400" b="0" i="1" u="none" strike="noStrike" kern="1200" cap="none" spc="0" normalizeH="0" baseline="0" noProof="0" smtClean="0">
-                                        <a:ln>
-                                          <a:noFill/>
-                                        </a:ln>
-                                        <a:solidFill>
-                                          <a:srgbClr val="000000"/>
-                                        </a:solidFill>
-                                        <a:effectLst/>
-                                        <a:uLnTx/>
-                                        <a:uFillTx/>
-                                        <a:latin typeface="Cambria Math" panose="02040503050406030204" pitchFamily="18" charset="0"/>
-                                        <a:ea typeface="+mn-ea"/>
-                                        <a:cs typeface="+mn-cs"/>
-                                      </a:rPr>
-                                      <m:t>10</m:t>
-                                    </m:r>
-                                  </m:sub>
-                                </m:sSub>
+                                </m:d>
                                 <m:r>
                                   <a:rPr kumimoji="0" lang="en-US" sz="1400" b="0" i="1" u="none" strike="noStrike" kern="1200" cap="none" spc="0" normalizeH="0" baseline="0" noProof="0" smtClean="0">
                                     <a:ln>
@@ -16717,24 +16410,7 @@
                                     <a:ea typeface="+mn-ea"/>
                                     <a:cs typeface="+mn-cs"/>
                                   </a:rPr>
-                                  <m:t>=0.</m:t>
-                                </m:r>
-                                <m:r>
-                                  <a:rPr kumimoji="0" lang="en-US" sz="1400" b="0" i="1" u="none" strike="noStrike" kern="1200" cap="none" spc="0" normalizeH="0" baseline="0" noProof="0" smtClean="0">
-                                    <a:ln>
-                                      <a:noFill/>
-                                    </a:ln>
-                                    <a:solidFill>
-                                      <a:srgbClr val="000000"/>
-                                    </a:solidFill>
-                                    <a:effectLst/>
-                                    <a:uLnTx/>
-                                    <a:uFillTx/>
-                                    <a:latin typeface="Cambria Math" panose="02040503050406030204" pitchFamily="18" charset="0"/>
-                                    <a:ea typeface="+mn-ea"/>
-                                    <a:cs typeface="+mn-cs"/>
-                                  </a:rPr>
-                                  <m:t>15</m:t>
+                                  <m:t>=0.15</m:t>
                                 </m:r>
                               </m:oMath>
                             </m:oMathPara>
@@ -16792,64 +16468,44 @@
                                 <m:jc m:val="left"/>
                               </m:oMathParaPr>
                               <m:oMath xmlns:m="http://schemas.openxmlformats.org/officeDocument/2006/math">
-                                <m:sSub>
-                                  <m:sSubPr>
+                                <m:d>
+                                  <m:dPr>
+                                    <m:begChr m:val="|"/>
+                                    <m:endChr m:val="|"/>
                                     <m:ctrlPr>
-                                      <a:rPr kumimoji="0" lang="cs-CZ" sz="1400" b="0" i="1" u="none" strike="noStrike" kern="1200" cap="none" spc="0" normalizeH="0" baseline="0" noProof="0" smtClean="0">
-                                        <a:ln>
-                                          <a:noFill/>
-                                        </a:ln>
-                                        <a:solidFill>
-                                          <a:srgbClr val="000000"/>
-                                        </a:solidFill>
-                                        <a:effectLst/>
-                                        <a:uLnTx/>
-                                        <a:uFillTx/>
+                                      <a:rPr lang="en-US" sz="1400" b="0" i="1" smtClean="0">
                                         <a:latin typeface="Cambria Math" panose="02040503050406030204" pitchFamily="18" charset="0"/>
-                                        <a:ea typeface="+mn-ea"/>
-                                        <a:cs typeface="+mn-cs"/>
                                       </a:rPr>
                                     </m:ctrlPr>
-                                  </m:sSubPr>
+                                  </m:dPr>
                                   <m:e>
-                                    <m:r>
-                                      <a:rPr kumimoji="0" lang="en-US" sz="1400" b="0" i="1" u="none" strike="noStrike" kern="1200" cap="none" spc="0" normalizeH="0" baseline="0" noProof="0" smtClean="0">
-                                        <a:ln>
-                                          <a:noFill/>
-                                        </a:ln>
-                                        <a:solidFill>
-                                          <a:srgbClr val="000000"/>
-                                        </a:solidFill>
-                                        <a:effectLst/>
-                                        <a:uLnTx/>
-                                        <a:uFillTx/>
-                                        <a:latin typeface="Cambria Math" panose="02040503050406030204" pitchFamily="18" charset="0"/>
-                                        <a:ea typeface="+mn-ea"/>
-                                        <a:cs typeface="+mn-cs"/>
-                                      </a:rPr>
-                                      <m:t>𝑐</m:t>
-                                    </m:r>
+                                    <m:sSub>
+                                      <m:sSubPr>
+                                        <m:ctrlPr>
+                                          <a:rPr lang="en-US" sz="1400" b="0" i="1" smtClean="0">
+                                            <a:latin typeface="Cambria Math" panose="02040503050406030204" pitchFamily="18" charset="0"/>
+                                          </a:rPr>
+                                        </m:ctrlPr>
+                                      </m:sSubPr>
+                                      <m:e>
+                                        <m:r>
+                                          <a:rPr lang="en-US" sz="1400" b="0" i="1" smtClean="0">
+                                            <a:latin typeface="Cambria Math" panose="02040503050406030204" pitchFamily="18" charset="0"/>
+                                          </a:rPr>
+                                          <m:t>𝑐</m:t>
+                                        </m:r>
+                                      </m:e>
+                                      <m:sub>
+                                        <m:r>
+                                          <a:rPr lang="en-US" sz="1400" b="0" i="1" smtClean="0">
+                                            <a:latin typeface="Cambria Math" panose="02040503050406030204" pitchFamily="18" charset="0"/>
+                                          </a:rPr>
+                                          <m:t>11</m:t>
+                                        </m:r>
+                                      </m:sub>
+                                    </m:sSub>
                                   </m:e>
-                                  <m:sub>
-                                    <m:r>
-                                      <a:rPr kumimoji="0" lang="en-US" sz="1400" b="0" i="1" u="none" strike="noStrike" kern="1200" cap="none" spc="0" normalizeH="0" baseline="0" noProof="0" smtClean="0">
-                                        <a:ln>
-                                          <a:noFill/>
-                                        </a:ln>
-                                        <a:solidFill>
-                                          <a:srgbClr val="000000"/>
-                                        </a:solidFill>
-                                        <a:effectLst/>
-                                        <a:uLnTx/>
-                                        <a:uFillTx/>
-                                        <a:latin typeface="Cambria Math" panose="02040503050406030204" pitchFamily="18" charset="0"/>
-                                        <a:ea typeface="+mn-ea"/>
-                                        <a:cs typeface="+mn-cs"/>
-                                      </a:rPr>
-                                      <m:t>10</m:t>
-                                    </m:r>
-                                  </m:sub>
-                                </m:sSub>
+                                </m:d>
                                 <m:r>
                                   <a:rPr kumimoji="0" lang="en-US" sz="1400" b="0" i="1" u="none" strike="noStrike" kern="1200" cap="none" spc="0" normalizeH="0" baseline="0" noProof="0" smtClean="0">
                                     <a:ln>
@@ -16865,24 +16521,7 @@
                                     <a:ea typeface="+mn-ea"/>
                                     <a:cs typeface="+mn-cs"/>
                                   </a:rPr>
-                                  <m:t>=0.</m:t>
-                                </m:r>
-                                <m:r>
-                                  <a:rPr kumimoji="0" lang="en-US" sz="1400" b="0" i="1" u="none" strike="noStrike" kern="1200" cap="none" spc="0" normalizeH="0" baseline="0" noProof="0" smtClean="0">
-                                    <a:ln>
-                                      <a:noFill/>
-                                    </a:ln>
-                                    <a:solidFill>
-                                      <a:srgbClr val="000000"/>
-                                    </a:solidFill>
-                                    <a:effectLst/>
-                                    <a:uLnTx/>
-                                    <a:uFillTx/>
-                                    <a:latin typeface="Cambria Math" panose="02040503050406030204" pitchFamily="18" charset="0"/>
-                                    <a:ea typeface="+mn-ea"/>
-                                    <a:cs typeface="+mn-cs"/>
-                                  </a:rPr>
-                                  <m:t>62</m:t>
+                                  <m:t>=0.62</m:t>
                                 </m:r>
                               </m:oMath>
                             </m:oMathPara>
@@ -16932,14 +16571,14 @@
               <p:nvPr>
                 <p:extLst>
                   <p:ext uri="{D42A27DB-BD31-4B8C-83A1-F6EECF244321}">
-                    <p14:modId xmlns:p14="http://schemas.microsoft.com/office/powerpoint/2010/main" val="427438633"/>
+                    <p14:modId xmlns:p14="http://schemas.microsoft.com/office/powerpoint/2010/main" val="1627975436"/>
                   </p:ext>
                 </p:extLst>
               </p:nvPr>
             </p:nvGraphicFramePr>
             <p:xfrm>
               <a:off x="612649" y="1680898"/>
-              <a:ext cx="2263902" cy="4440852"/>
+              <a:ext cx="2194243" cy="4440852"/>
             </p:xfrm>
             <a:graphic>
               <a:graphicData uri="http://schemas.openxmlformats.org/drawingml/2006/table">
@@ -16948,7 +16587,7 @@
                     <a:tableStyleId>{0505E3EF-67EA-436B-97B2-0124C06EBD24}</a:tableStyleId>
                   </a:tblPr>
                   <a:tblGrid>
-                    <a:gridCol w="2263902">
+                    <a:gridCol w="2194243">
                       <a:extLst>
                         <a:ext uri="{9D8B030D-6E8A-4147-A177-3AD203B41FA5}">
                           <a16:colId xmlns:a16="http://schemas.microsoft.com/office/drawing/2014/main" val="2548978061"/>
@@ -16999,7 +16638,7 @@
                         <a:blipFill>
                           <a:blip r:embed="rId3"/>
                           <a:stretch>
-                            <a:fillRect l="-269" t="-101786" r="-538" b="-1107143"/>
+                            <a:fillRect l="-277" t="-101786" r="-554" b="-1107143"/>
                           </a:stretch>
                         </a:blipFill>
                       </a:tcPr>
@@ -17023,7 +16662,7 @@
                         <a:blipFill>
                           <a:blip r:embed="rId3"/>
                           <a:stretch>
-                            <a:fillRect l="-269" t="-201786" r="-538" b="-1007143"/>
+                            <a:fillRect l="-277" t="-201786" r="-554" b="-1007143"/>
                           </a:stretch>
                         </a:blipFill>
                       </a:tcPr>
@@ -17047,7 +16686,7 @@
                         <a:blipFill>
                           <a:blip r:embed="rId3"/>
                           <a:stretch>
-                            <a:fillRect l="-269" t="-296491" r="-538" b="-889474"/>
+                            <a:fillRect l="-277" t="-296491" r="-554" b="-889474"/>
                           </a:stretch>
                         </a:blipFill>
                       </a:tcPr>
@@ -17071,7 +16710,7 @@
                         <a:blipFill>
                           <a:blip r:embed="rId3"/>
                           <a:stretch>
-                            <a:fillRect l="-269" t="-403571" r="-538" b="-805357"/>
+                            <a:fillRect l="-277" t="-403571" r="-554" b="-805357"/>
                           </a:stretch>
                         </a:blipFill>
                       </a:tcPr>
@@ -17095,7 +16734,7 @@
                         <a:blipFill>
                           <a:blip r:embed="rId3"/>
                           <a:stretch>
-                            <a:fillRect l="-269" t="-503571" r="-538" b="-705357"/>
+                            <a:fillRect l="-277" t="-503571" r="-554" b="-705357"/>
                           </a:stretch>
                         </a:blipFill>
                       </a:tcPr>
@@ -17119,7 +16758,7 @@
                         <a:blipFill>
                           <a:blip r:embed="rId3"/>
                           <a:stretch>
-                            <a:fillRect l="-269" t="-603571" r="-538" b="-605357"/>
+                            <a:fillRect l="-277" t="-603571" r="-554" b="-605357"/>
                           </a:stretch>
                         </a:blipFill>
                       </a:tcPr>
@@ -17143,7 +16782,7 @@
                         <a:blipFill>
                           <a:blip r:embed="rId3"/>
                           <a:stretch>
-                            <a:fillRect l="-269" t="-703571" r="-538" b="-505357"/>
+                            <a:fillRect l="-277" t="-703571" r="-554" b="-505357"/>
                           </a:stretch>
                         </a:blipFill>
                       </a:tcPr>
@@ -17167,7 +16806,7 @@
                         <a:blipFill>
                           <a:blip r:embed="rId3"/>
                           <a:stretch>
-                            <a:fillRect l="-269" t="-803571" r="-538" b="-405357"/>
+                            <a:fillRect l="-277" t="-803571" r="-554" b="-405357"/>
                           </a:stretch>
                         </a:blipFill>
                       </a:tcPr>
@@ -17191,7 +16830,7 @@
                         <a:blipFill>
                           <a:blip r:embed="rId3"/>
                           <a:stretch>
-                            <a:fillRect l="-269" t="-887719" r="-538" b="-298246"/>
+                            <a:fillRect l="-277" t="-887719" r="-554" b="-298246"/>
                           </a:stretch>
                         </a:blipFill>
                       </a:tcPr>
@@ -17215,7 +16854,7 @@
                         <a:blipFill>
                           <a:blip r:embed="rId3"/>
                           <a:stretch>
-                            <a:fillRect l="-269" t="-1005357" r="-538" b="-203571"/>
+                            <a:fillRect l="-277" t="-1005357" r="-554" b="-203571"/>
                           </a:stretch>
                         </a:blipFill>
                       </a:tcPr>
@@ -17239,7 +16878,7 @@
                         <a:blipFill>
                           <a:blip r:embed="rId3"/>
                           <a:stretch>
-                            <a:fillRect l="-269" t="-1105357" r="-538" b="-103571"/>
+                            <a:fillRect l="-277" t="-1105357" r="-554" b="-103571"/>
                           </a:stretch>
                         </a:blipFill>
                       </a:tcPr>
@@ -17263,7 +16902,7 @@
                         <a:blipFill>
                           <a:blip r:embed="rId3"/>
                           <a:stretch>
-                            <a:fillRect l="-269" t="-1205357" r="-538" b="-3571"/>
+                            <a:fillRect l="-277" t="-1205357" r="-554" b="-3571"/>
                           </a:stretch>
                         </a:blipFill>
                       </a:tcPr>
@@ -18414,15 +18053,6 @@
 </file>
 
 <file path=customXml/item1.xml><?xml version="1.0" encoding="utf-8"?>
-<?mso-contentType ?>
-<FormTemplates xmlns="http://schemas.microsoft.com/sharepoint/v3/contenttype/forms">
-  <Display>DocumentLibraryForm</Display>
-  <Edit>DocumentLibraryForm</Edit>
-  <New>DocumentLibraryForm</New>
-</FormTemplates>
-</file>
-
-<file path=customXml/item2.xml><?xml version="1.0" encoding="utf-8"?>
 <ct:contentTypeSchema xmlns:ct="http://schemas.microsoft.com/office/2006/metadata/contentType" xmlns:ma="http://schemas.microsoft.com/office/2006/metadata/properties/metaAttributes" ct:_="" ma:_="" ma:contentTypeName="Dokument" ma:contentTypeID="0x010100F1E5E07130354F4C90B7AEF965F7F7CF" ma:contentTypeVersion="16" ma:contentTypeDescription="Umožňuje vytvoriť nový dokument." ma:contentTypeScope="" ma:versionID="9e31676eadb4c6163cc2bdb453290bee">
   <xsd:schema xmlns:xsd="http://www.w3.org/2001/XMLSchema" xmlns:xs="http://www.w3.org/2001/XMLSchema" xmlns:p="http://schemas.microsoft.com/office/2006/metadata/properties" xmlns:ns3="231c4eac-96b6-4cf2-b251-23b838f7cf09" xmlns:ns4="3c9e0e30-e467-4344-9c23-ea945731e275" targetNamespace="http://schemas.microsoft.com/office/2006/metadata/properties" ma:root="true" ma:fieldsID="a11fbbdd28f19cbff9eff49f54037749" ns3:_="" ns4:_="">
     <xsd:import namespace="231c4eac-96b6-4cf2-b251-23b838f7cf09"/>
@@ -18661,6 +18291,15 @@
 </ct:contentTypeSchema>
 </file>
 
+<file path=customXml/item2.xml><?xml version="1.0" encoding="utf-8"?>
+<?mso-contentType ?>
+<FormTemplates xmlns="http://schemas.microsoft.com/sharepoint/v3/contenttype/forms">
+  <Display>DocumentLibraryForm</Display>
+  <Edit>DocumentLibraryForm</Edit>
+  <New>DocumentLibraryForm</New>
+</FormTemplates>
+</file>
+
 <file path=customXml/item3.xml><?xml version="1.0" encoding="utf-8"?>
 <p:properties xmlns:p="http://schemas.microsoft.com/office/2006/metadata/properties" xmlns:xsi="http://www.w3.org/2001/XMLSchema-instance" xmlns:pc="http://schemas.microsoft.com/office/infopath/2007/PartnerControls">
   <documentManagement>
@@ -18670,14 +18309,6 @@
 </file>
 
 <file path=customXml/itemProps1.xml><?xml version="1.0" encoding="utf-8"?>
-<ds:datastoreItem xmlns:ds="http://schemas.openxmlformats.org/officeDocument/2006/customXml" ds:itemID="{6D246073-CAEC-4C36-8D16-35E55B494596}">
-  <ds:schemaRefs>
-    <ds:schemaRef ds:uri="http://schemas.microsoft.com/sharepoint/v3/contenttype/forms"/>
-  </ds:schemaRefs>
-</ds:datastoreItem>
-</file>
-
-<file path=customXml/itemProps2.xml><?xml version="1.0" encoding="utf-8"?>
 <ds:datastoreItem xmlns:ds="http://schemas.openxmlformats.org/officeDocument/2006/customXml" ds:itemID="{9C2C5ADA-C04A-49B0-BB4B-58CF2286EFA3}">
   <ds:schemaRefs>
     <ds:schemaRef ds:uri="http://schemas.microsoft.com/office/2006/metadata/contentType"/>
@@ -18692,6 +18323,14 @@
     <ds:schemaRef ds:uri="http://purl.org/dc/elements/1.1/"/>
     <ds:schemaRef ds:uri="http://purl.org/dc/terms/"/>
     <ds:schemaRef ds:uri="http://schemas.microsoft.com/internal/obd"/>
+  </ds:schemaRefs>
+</ds:datastoreItem>
+</file>
+
+<file path=customXml/itemProps2.xml><?xml version="1.0" encoding="utf-8"?>
+<ds:datastoreItem xmlns:ds="http://schemas.openxmlformats.org/officeDocument/2006/customXml" ds:itemID="{6D246073-CAEC-4C36-8D16-35E55B494596}">
+  <ds:schemaRefs>
+    <ds:schemaRef ds:uri="http://schemas.microsoft.com/sharepoint/v3/contenttype/forms"/>
   </ds:schemaRefs>
 </ds:datastoreItem>
 </file>

</xml_diff>